<commit_message>
updated titles of subpages and ppt
</commit_message>
<xml_diff>
--- a/Gender inequality –Violence against women.pptx
+++ b/Gender inequality –Violence against women.pptx
@@ -108,6 +108,11 @@
       </a:defRPr>
     </a:lvl9pPr>
   </p:defaultTextStyle>
+  <p:extLst>
+    <p:ext uri="{EFAFB233-063F-42B5-8137-9DF3F51BA10A}">
+      <p15:sldGuideLst xmlns:p15="http://schemas.microsoft.com/office/powerpoint/2012/main"/>
+    </p:ext>
+  </p:extLst>
 </p:presentation>
 </file>
 
@@ -514,7 +519,7 @@
           <a:p>
             <a:fld id="{83284890-85D2-4D7B-8EF5-15A9C1DB8F42}" type="datetimeFigureOut">
               <a:rPr lang="en-US" dirty="0"/>
-              <a:t>3/6/2017</a:t>
+              <a:t>3/11/2017</a:t>
             </a:fld>
             <a:endParaRPr lang="en-US" dirty="0"/>
           </a:p>
@@ -689,7 +694,7 @@
           <a:p>
             <a:fld id="{87157CC2-0FC8-4686-B024-99790E0F5162}" type="datetimeFigureOut">
               <a:rPr lang="en-US" dirty="0"/>
-              <a:t>3/6/2017</a:t>
+              <a:t>3/11/2017</a:t>
             </a:fld>
             <a:endParaRPr lang="en-US" dirty="0"/>
           </a:p>
@@ -864,7 +869,7 @@
           <a:p>
             <a:fld id="{F6764DA5-CD3D-4590-A511-FCD3BC7A793E}" type="datetimeFigureOut">
               <a:rPr lang="en-US" dirty="0"/>
-              <a:t>3/6/2017</a:t>
+              <a:t>3/11/2017</a:t>
             </a:fld>
             <a:endParaRPr lang="en-US" dirty="0"/>
           </a:p>
@@ -1029,7 +1034,7 @@
           <a:p>
             <a:fld id="{82F5661D-6934-4B32-B92C-470368BF1EC6}" type="datetimeFigureOut">
               <a:rPr lang="en-US" dirty="0"/>
-              <a:t>3/6/2017</a:t>
+              <a:t>3/11/2017</a:t>
             </a:fld>
             <a:endParaRPr lang="en-US" dirty="0"/>
           </a:p>
@@ -1337,7 +1342,7 @@
           <a:p>
             <a:fld id="{C6F822A4-8DA6-4447-9B1F-C5DB58435268}" type="datetimeFigureOut">
               <a:rPr lang="en-US" dirty="0"/>
-              <a:t>3/6/2017</a:t>
+              <a:t>3/11/2017</a:t>
             </a:fld>
             <a:endParaRPr lang="en-US" dirty="0"/>
           </a:p>
@@ -1719,7 +1724,7 @@
           <a:p>
             <a:fld id="{E548D31E-DCDA-41A7-9C67-C4B11B94D21D}" type="datetimeFigureOut">
               <a:rPr lang="en-US" dirty="0"/>
-              <a:t>3/6/2017</a:t>
+              <a:t>3/11/2017</a:t>
             </a:fld>
             <a:endParaRPr lang="en-US" dirty="0"/>
           </a:p>
@@ -2148,7 +2153,7 @@
           <a:p>
             <a:fld id="{9B3762C0-B258-48F1-ADE6-176B4174CCDD}" type="datetimeFigureOut">
               <a:rPr lang="en-US" dirty="0"/>
-              <a:t>3/6/2017</a:t>
+              <a:t>3/11/2017</a:t>
             </a:fld>
             <a:endParaRPr lang="en-US" dirty="0"/>
           </a:p>
@@ -2261,7 +2266,7 @@
           <a:p>
             <a:fld id="{677919A6-33EB-49BD-A62F-1FA56B9F9712}" type="datetimeFigureOut">
               <a:rPr lang="en-US" dirty="0"/>
-              <a:t>3/6/2017</a:t>
+              <a:t>3/11/2017</a:t>
             </a:fld>
             <a:endParaRPr lang="en-US" dirty="0"/>
           </a:p>
@@ -2351,7 +2356,7 @@
           <a:p>
             <a:fld id="{CA4E7D1B-D673-4CF6-8672-009D42ABD2A0}" type="datetimeFigureOut">
               <a:rPr lang="en-US" dirty="0"/>
-              <a:t>3/6/2017</a:t>
+              <a:t>3/11/2017</a:t>
             </a:fld>
             <a:endParaRPr lang="en-US" dirty="0"/>
           </a:p>
@@ -2696,7 +2701,7 @@
           <a:p>
             <a:fld id="{DA16AA21-1863-4931-97CB-99D0A168701B}" type="datetimeFigureOut">
               <a:rPr lang="en-US" dirty="0"/>
-              <a:t>3/6/2017</a:t>
+              <a:t>3/11/2017</a:t>
             </a:fld>
             <a:endParaRPr lang="en-US" dirty="0"/>
           </a:p>
@@ -3116,7 +3121,7 @@
           <a:p>
             <a:fld id="{3772C379-9A7C-4C87-A116-CBE9F58B04C5}" type="datetimeFigureOut">
               <a:rPr lang="en-US" dirty="0"/>
-              <a:t>3/6/2017</a:t>
+              <a:t>3/11/2017</a:t>
             </a:fld>
             <a:endParaRPr lang="en-US" dirty="0"/>
           </a:p>
@@ -3392,7 +3397,7 @@
           <a:p>
             <a:fld id="{8664C608-40B1-4030-A28D-5B74BC98ADCE}" type="datetimeFigureOut">
               <a:rPr lang="en-US" dirty="0"/>
-              <a:t>3/6/2017</a:t>
+              <a:t>3/11/2017</a:t>
             </a:fld>
             <a:endParaRPr lang="en-US" dirty="0"/>
           </a:p>
@@ -4014,13 +4019,13 @@
         </p:spPr>
         <p:txBody>
           <a:bodyPr>
-            <a:normAutofit lnSpcReduction="10000"/>
+            <a:normAutofit/>
           </a:bodyPr>
           <a:lstStyle/>
           <a:p>
             <a:r>
               <a:rPr lang="en-SG" b="1" dirty="0"/>
-              <a:t>A Web App by 3 Girls &amp; 1 Guy:</a:t>
+              <a:t>A Web App by 2 Girls &amp; 1 Guy:</a:t>
             </a:r>
           </a:p>
           <a:p>
@@ -4034,13 +4039,18 @@
             </a:r>
             <a:r>
               <a:rPr lang="en-SG" dirty="0"/>
-              <a:t> Tan</a:t>
-            </a:r>
+              <a:t> </a:t>
+            </a:r>
+            <a:r>
+              <a:rPr lang="en-SG" dirty="0" err="1"/>
+              <a:t>Tandean</a:t>
+            </a:r>
+            <a:endParaRPr lang="en-SG" dirty="0"/>
           </a:p>
           <a:p>
             <a:r>
               <a:rPr lang="en-SG" dirty="0"/>
-              <a:t>	Myrna</a:t>
+              <a:t>	Myrna Angeles</a:t>
             </a:r>
           </a:p>
           <a:p>
@@ -4050,14 +4060,11 @@
             </a:r>
             <a:r>
               <a:rPr lang="en-SG" dirty="0" err="1"/>
-              <a:t>Nithya</a:t>
-            </a:r>
-            <a:endParaRPr lang="en-SG" dirty="0"/>
-          </a:p>
-          <a:p>
+              <a:t>Siow</a:t>
+            </a:r>
             <a:r>
               <a:rPr lang="en-SG" dirty="0"/>
-              <a:t>	Yi  Sheng</a:t>
+              <a:t> Yi  Sheng</a:t>
             </a:r>
           </a:p>
           <a:p>
@@ -4197,11 +4204,6 @@
               </a:rPr>
               <a:t>	From http://www.unwomen-nc.org.sg/violence_against_women.acvx?section=3</a:t>
             </a:r>
-            <a:endParaRPr lang="en-SG" sz="1500" dirty="0">
-              <a:solidFill>
-                <a:srgbClr val="00B050"/>
-              </a:solidFill>
-            </a:endParaRPr>
           </a:p>
           <a:p>
             <a:r>

</xml_diff>